<commit_message>
req: some work on the explorer
</commit_message>
<xml_diff>
--- a/code/languages/org.iets3.core/languages/org.iets3.req.core/icons/icons.pptx
+++ b/code/languages/org.iets3.core/languages/org.iets3.req.core/icons/icons.pptx
@@ -285,7 +285,7 @@
           <a:lstStyle/>
           <a:p>
             <a:fld id="{CFFD64F9-81CB-D544-9A9C-B48F900B5B35}" type="datetimeFigureOut">
-              <a:t>11/12/15</a:t>
+              <a:t>17/12/15</a:t>
             </a:fld>
             <a:endParaRPr lang="de-DE"/>
           </a:p>
@@ -451,7 +451,7 @@
           <a:lstStyle/>
           <a:p>
             <a:fld id="{CFFD64F9-81CB-D544-9A9C-B48F900B5B35}" type="datetimeFigureOut">
-              <a:t>11/12/15</a:t>
+              <a:t>17/12/15</a:t>
             </a:fld>
             <a:endParaRPr lang="de-DE"/>
           </a:p>
@@ -627,7 +627,7 @@
           <a:lstStyle/>
           <a:p>
             <a:fld id="{CFFD64F9-81CB-D544-9A9C-B48F900B5B35}" type="datetimeFigureOut">
-              <a:t>11/12/15</a:t>
+              <a:t>17/12/15</a:t>
             </a:fld>
             <a:endParaRPr lang="de-DE"/>
           </a:p>
@@ -793,7 +793,7 @@
           <a:lstStyle/>
           <a:p>
             <a:fld id="{CFFD64F9-81CB-D544-9A9C-B48F900B5B35}" type="datetimeFigureOut">
-              <a:t>11/12/15</a:t>
+              <a:t>17/12/15</a:t>
             </a:fld>
             <a:endParaRPr lang="de-DE"/>
           </a:p>
@@ -1036,7 +1036,7 @@
           <a:lstStyle/>
           <a:p>
             <a:fld id="{CFFD64F9-81CB-D544-9A9C-B48F900B5B35}" type="datetimeFigureOut">
-              <a:t>11/12/15</a:t>
+              <a:t>17/12/15</a:t>
             </a:fld>
             <a:endParaRPr lang="de-DE"/>
           </a:p>
@@ -1319,7 +1319,7 @@
           <a:lstStyle/>
           <a:p>
             <a:fld id="{CFFD64F9-81CB-D544-9A9C-B48F900B5B35}" type="datetimeFigureOut">
-              <a:t>11/12/15</a:t>
+              <a:t>17/12/15</a:t>
             </a:fld>
             <a:endParaRPr lang="de-DE"/>
           </a:p>
@@ -1736,7 +1736,7 @@
           <a:lstStyle/>
           <a:p>
             <a:fld id="{CFFD64F9-81CB-D544-9A9C-B48F900B5B35}" type="datetimeFigureOut">
-              <a:t>11/12/15</a:t>
+              <a:t>17/12/15</a:t>
             </a:fld>
             <a:endParaRPr lang="de-DE"/>
           </a:p>
@@ -1851,7 +1851,7 @@
           <a:lstStyle/>
           <a:p>
             <a:fld id="{CFFD64F9-81CB-D544-9A9C-B48F900B5B35}" type="datetimeFigureOut">
-              <a:t>11/12/15</a:t>
+              <a:t>17/12/15</a:t>
             </a:fld>
             <a:endParaRPr lang="de-DE"/>
           </a:p>
@@ -1944,7 +1944,7 @@
           <a:lstStyle/>
           <a:p>
             <a:fld id="{CFFD64F9-81CB-D544-9A9C-B48F900B5B35}" type="datetimeFigureOut">
-              <a:t>11/12/15</a:t>
+              <a:t>17/12/15</a:t>
             </a:fld>
             <a:endParaRPr lang="de-DE"/>
           </a:p>
@@ -2217,7 +2217,7 @@
           <a:lstStyle/>
           <a:p>
             <a:fld id="{CFFD64F9-81CB-D544-9A9C-B48F900B5B35}" type="datetimeFigureOut">
-              <a:t>11/12/15</a:t>
+              <a:t>17/12/15</a:t>
             </a:fld>
             <a:endParaRPr lang="de-DE"/>
           </a:p>
@@ -2467,7 +2467,7 @@
           <a:lstStyle/>
           <a:p>
             <a:fld id="{CFFD64F9-81CB-D544-9A9C-B48F900B5B35}" type="datetimeFigureOut">
-              <a:t>11/12/15</a:t>
+              <a:t>17/12/15</a:t>
             </a:fld>
             <a:endParaRPr lang="de-DE"/>
           </a:p>
@@ -2676,7 +2676,7 @@
           </a:lstStyle>
           <a:p>
             <a:fld id="{CFFD64F9-81CB-D544-9A9C-B48F900B5B35}" type="datetimeFigureOut">
-              <a:t>11/12/15</a:t>
+              <a:t>17/12/15</a:t>
             </a:fld>
             <a:endParaRPr lang="de-DE"/>
           </a:p>
@@ -3452,6 +3452,284 @@
           <a:p>
             <a:pPr algn="ctr"/>
             <a:endParaRPr lang="de-DE"/>
+          </a:p>
+        </p:txBody>
+      </p:sp>
+      <p:pic>
+        <p:nvPicPr>
+          <p:cNvPr id="2" name="Bild 1"/>
+          <p:cNvPicPr>
+            <a:picLocks noChangeAspect="1"/>
+          </p:cNvPicPr>
+          <p:nvPr/>
+        </p:nvPicPr>
+        <p:blipFill>
+          <a:blip r:embed="rId2">
+            <a:duotone>
+              <a:prstClr val="black"/>
+              <a:srgbClr val="259B16">
+                <a:tint val="45000"/>
+                <a:satMod val="400000"/>
+              </a:srgbClr>
+            </a:duotone>
+          </a:blip>
+          <a:stretch>
+            <a:fillRect/>
+          </a:stretch>
+        </p:blipFill>
+        <p:spPr>
+          <a:xfrm>
+            <a:off x="1832242" y="3121534"/>
+            <a:ext cx="1120767" cy="1120767"/>
+          </a:xfrm>
+          <a:prstGeom prst="rect">
+            <a:avLst/>
+          </a:prstGeom>
+        </p:spPr>
+      </p:pic>
+      <p:sp>
+        <p:nvSpPr>
+          <p:cNvPr id="13" name="Rechteck 12"/>
+          <p:cNvSpPr/>
+          <p:nvPr/>
+        </p:nvSpPr>
+        <p:spPr>
+          <a:xfrm>
+            <a:off x="1763390" y="3041243"/>
+            <a:ext cx="1277597" cy="1277597"/>
+          </a:xfrm>
+          <a:prstGeom prst="rect">
+            <a:avLst/>
+          </a:prstGeom>
+          <a:noFill/>
+          <a:ln>
+            <a:solidFill>
+              <a:schemeClr val="tx1"/>
+            </a:solidFill>
+          </a:ln>
+          <a:effectLst/>
+        </p:spPr>
+        <p:style>
+          <a:lnRef idx="1">
+            <a:schemeClr val="accent1"/>
+          </a:lnRef>
+          <a:fillRef idx="3">
+            <a:schemeClr val="accent1"/>
+          </a:fillRef>
+          <a:effectRef idx="2">
+            <a:schemeClr val="accent1"/>
+          </a:effectRef>
+          <a:fontRef idx="minor">
+            <a:schemeClr val="lt1"/>
+          </a:fontRef>
+        </p:style>
+        <p:txBody>
+          <a:bodyPr rtlCol="0" anchor="ctr"/>
+          <a:lstStyle/>
+          <a:p>
+            <a:pPr algn="ctr"/>
+            <a:endParaRPr lang="de-DE"/>
+          </a:p>
+        </p:txBody>
+      </p:sp>
+      <p:sp>
+        <p:nvSpPr>
+          <p:cNvPr id="15" name="Rechteck 14"/>
+          <p:cNvSpPr/>
+          <p:nvPr/>
+        </p:nvSpPr>
+        <p:spPr>
+          <a:xfrm>
+            <a:off x="2107653" y="3549362"/>
+            <a:ext cx="577596" cy="482618"/>
+          </a:xfrm>
+          <a:prstGeom prst="rect">
+            <a:avLst/>
+          </a:prstGeom>
+          <a:solidFill>
+            <a:schemeClr val="bg1"/>
+          </a:solidFill>
+          <a:ln>
+            <a:noFill/>
+          </a:ln>
+          <a:effectLst/>
+        </p:spPr>
+        <p:style>
+          <a:lnRef idx="1">
+            <a:schemeClr val="accent1"/>
+          </a:lnRef>
+          <a:fillRef idx="3">
+            <a:schemeClr val="accent1"/>
+          </a:fillRef>
+          <a:effectRef idx="2">
+            <a:schemeClr val="accent1"/>
+          </a:effectRef>
+          <a:fontRef idx="minor">
+            <a:schemeClr val="lt1"/>
+          </a:fontRef>
+        </p:style>
+        <p:txBody>
+          <a:bodyPr rtlCol="0" anchor="ctr"/>
+          <a:lstStyle/>
+          <a:p>
+            <a:pPr algn="ctr"/>
+            <a:endParaRPr lang="de-DE"/>
+          </a:p>
+        </p:txBody>
+      </p:sp>
+      <p:sp>
+        <p:nvSpPr>
+          <p:cNvPr id="3" name="Textfeld 2"/>
+          <p:cNvSpPr txBox="1"/>
+          <p:nvPr/>
+        </p:nvSpPr>
+        <p:spPr>
+          <a:xfrm>
+            <a:off x="2034368" y="3106226"/>
+            <a:ext cx="704490" cy="1200329"/>
+          </a:xfrm>
+          <a:prstGeom prst="rect">
+            <a:avLst/>
+          </a:prstGeom>
+          <a:noFill/>
+        </p:spPr>
+        <p:txBody>
+          <a:bodyPr wrap="none" rtlCol="0">
+            <a:spAutoFit/>
+          </a:bodyPr>
+          <a:lstStyle/>
+          <a:p>
+            <a:r>
+              <a:rPr lang="de-DE" sz="7200" b="1">
+                <a:solidFill>
+                  <a:srgbClr val="008000"/>
+                </a:solidFill>
+              </a:rPr>
+              <a:t>R</a:t>
+            </a:r>
+          </a:p>
+        </p:txBody>
+      </p:sp>
+      <p:sp>
+        <p:nvSpPr>
+          <p:cNvPr id="16" name="Rechteck 15"/>
+          <p:cNvSpPr/>
+          <p:nvPr/>
+        </p:nvSpPr>
+        <p:spPr>
+          <a:xfrm>
+            <a:off x="3744207" y="3041243"/>
+            <a:ext cx="1277597" cy="1277597"/>
+          </a:xfrm>
+          <a:prstGeom prst="rect">
+            <a:avLst/>
+          </a:prstGeom>
+          <a:noFill/>
+          <a:ln>
+            <a:solidFill>
+              <a:schemeClr val="tx1"/>
+            </a:solidFill>
+          </a:ln>
+          <a:effectLst/>
+        </p:spPr>
+        <p:style>
+          <a:lnRef idx="1">
+            <a:schemeClr val="accent1"/>
+          </a:lnRef>
+          <a:fillRef idx="3">
+            <a:schemeClr val="accent1"/>
+          </a:fillRef>
+          <a:effectRef idx="2">
+            <a:schemeClr val="accent1"/>
+          </a:effectRef>
+          <a:fontRef idx="minor">
+            <a:schemeClr val="lt1"/>
+          </a:fontRef>
+        </p:style>
+        <p:txBody>
+          <a:bodyPr rtlCol="0" anchor="ctr"/>
+          <a:lstStyle/>
+          <a:p>
+            <a:pPr algn="ctr"/>
+            <a:endParaRPr lang="de-DE"/>
+          </a:p>
+        </p:txBody>
+      </p:sp>
+      <p:sp>
+        <p:nvSpPr>
+          <p:cNvPr id="5" name="Oval 4"/>
+          <p:cNvSpPr/>
+          <p:nvPr/>
+        </p:nvSpPr>
+        <p:spPr>
+          <a:xfrm>
+            <a:off x="3916278" y="3213346"/>
+            <a:ext cx="941050" cy="941050"/>
+          </a:xfrm>
+          <a:prstGeom prst="ellipse">
+            <a:avLst/>
+          </a:prstGeom>
+          <a:solidFill>
+            <a:srgbClr val="147F09"/>
+          </a:solidFill>
+          <a:ln>
+            <a:noFill/>
+          </a:ln>
+          <a:effectLst/>
+        </p:spPr>
+        <p:style>
+          <a:lnRef idx="1">
+            <a:schemeClr val="accent1"/>
+          </a:lnRef>
+          <a:fillRef idx="3">
+            <a:schemeClr val="accent1"/>
+          </a:fillRef>
+          <a:effectRef idx="2">
+            <a:schemeClr val="accent1"/>
+          </a:effectRef>
+          <a:fontRef idx="minor">
+            <a:schemeClr val="lt1"/>
+          </a:fontRef>
+        </p:style>
+        <p:txBody>
+          <a:bodyPr rtlCol="0" anchor="ctr"/>
+          <a:lstStyle/>
+          <a:p>
+            <a:pPr algn="ctr"/>
+            <a:endParaRPr lang="de-DE"/>
+          </a:p>
+        </p:txBody>
+      </p:sp>
+      <p:sp>
+        <p:nvSpPr>
+          <p:cNvPr id="17" name="Textfeld 16"/>
+          <p:cNvSpPr txBox="1"/>
+          <p:nvPr/>
+        </p:nvSpPr>
+        <p:spPr>
+          <a:xfrm>
+            <a:off x="4061032" y="3017577"/>
+            <a:ext cx="704490" cy="1200329"/>
+          </a:xfrm>
+          <a:prstGeom prst="rect">
+            <a:avLst/>
+          </a:prstGeom>
+          <a:noFill/>
+        </p:spPr>
+        <p:txBody>
+          <a:bodyPr wrap="none" rtlCol="0">
+            <a:spAutoFit/>
+          </a:bodyPr>
+          <a:lstStyle/>
+          <a:p>
+            <a:r>
+              <a:rPr lang="de-DE" sz="7200" b="1">
+                <a:solidFill>
+                  <a:schemeClr val="bg1"/>
+                </a:solidFill>
+              </a:rPr>
+              <a:t>R</a:t>
+            </a:r>
           </a:p>
         </p:txBody>
       </p:sp>

</xml_diff>